<commit_message>
near final copy - need to discuss about one variable
</commit_message>
<xml_diff>
--- a/Lending Club Case Study.pptx
+++ b/Lending Club Case Study.pptx
@@ -15,7 +15,7 @@
     <p:sldId id="275" r:id="rId6"/>
     <p:sldId id="278" r:id="rId7"/>
     <p:sldId id="276" r:id="rId8"/>
-    <p:sldId id="274" r:id="rId9"/>
+    <p:sldId id="279" r:id="rId9"/>
   </p:sldIdLst>
   <p:sldSz cx="12192000" cy="6858000"/>
   <p:notesSz cx="6858000" cy="9144000"/>
@@ -3124,8 +3124,8 @@
     <dgm:cxn modelId="{FD9482CE-5868-4F4A-89D5-2FBF978C2317}" type="presOf" srcId="{97E1F8DA-9184-495E-996C-36244B32406E}" destId="{0642C37F-FB30-4846-BE4B-D2F52B6BEEBA}" srcOrd="0" destOrd="0" presId="urn:microsoft.com/office/officeart/2005/8/layout/chevron1"/>
     <dgm:cxn modelId="{02D998C1-FEF0-4BFC-82DB-63447C47D2AF}" srcId="{5AA2EE81-2B46-4E7C-8151-C5ADBC1E9B06}" destId="{A96FDC53-DB34-4D6A-834A-3DF6FDD23237}" srcOrd="3" destOrd="0" parTransId="{81E629A4-3158-4227-B78C-4E5534F5AE0E}" sibTransId="{148812BE-DA57-4A7A-9880-5BB9A5F41D0F}"/>
     <dgm:cxn modelId="{61877155-D254-4A67-87F5-B25311DED62A}" type="presOf" srcId="{1922C221-EC52-446B-A288-D28C05E1AD6B}" destId="{0642C37F-FB30-4846-BE4B-D2F52B6BEEBA}" srcOrd="0" destOrd="5" presId="urn:microsoft.com/office/officeart/2005/8/layout/chevron1"/>
+    <dgm:cxn modelId="{1CB58B3F-9CBA-4CE2-A084-777F758C5A5C}" srcId="{F846C395-E301-4F18-BCE1-229CA8D7EE54}" destId="{1346EFC4-CC1F-427C-A524-354B4BEF2CE8}" srcOrd="1" destOrd="0" parTransId="{E9321E74-DC68-4327-961C-C156F867F2EC}" sibTransId="{E6179ECD-CF9A-430A-A248-32D59B742019}"/>
     <dgm:cxn modelId="{E50E22ED-4B7D-4533-BB62-9AB2C93EF609}" type="presOf" srcId="{4D30DD77-81D7-4E67-974B-0E08966348AA}" destId="{DBC03AB4-E21A-47D4-99DD-ACE0B3A3D1FB}" srcOrd="0" destOrd="0" presId="urn:microsoft.com/office/officeart/2005/8/layout/chevron1"/>
-    <dgm:cxn modelId="{1CB58B3F-9CBA-4CE2-A084-777F758C5A5C}" srcId="{F846C395-E301-4F18-BCE1-229CA8D7EE54}" destId="{1346EFC4-CC1F-427C-A524-354B4BEF2CE8}" srcOrd="1" destOrd="0" parTransId="{E9321E74-DC68-4327-961C-C156F867F2EC}" sibTransId="{E6179ECD-CF9A-430A-A248-32D59B742019}"/>
     <dgm:cxn modelId="{13F23CFD-8B42-4B46-9C1D-75E18BA7E3D7}" type="presOf" srcId="{27A6CE2F-826E-44AF-B8FB-39149E70C2A0}" destId="{6B847F7A-43D7-4D12-B68D-C4F949358D9C}" srcOrd="0" destOrd="2" presId="urn:microsoft.com/office/officeart/2005/8/layout/chevron1"/>
     <dgm:cxn modelId="{DACE4E2D-41DF-4A8D-AE74-AE5DD1FFE72B}" srcId="{2048D61B-9E1D-4EF9-8274-0AE3554F1FFE}" destId="{1922C221-EC52-446B-A288-D28C05E1AD6B}" srcOrd="2" destOrd="0" parTransId="{D5BCB31C-ECF2-432C-A294-F935D5C0AC2A}" sibTransId="{2258886C-9B53-484E-B852-0ED3C9E44A1C}"/>
     <dgm:cxn modelId="{E483112B-AF62-41D7-A6A1-50276A351D4E}" srcId="{98C1584F-F82E-4C7C-8C81-5CC970AF2400}" destId="{D5DDD7BD-B53A-42EA-89CC-FC6635F2861B}" srcOrd="0" destOrd="0" parTransId="{2A01F52E-3D75-4A0B-B4DB-9DCEEE31812C}" sibTransId="{87D6EBBF-3CE6-45F7-8B00-D33044BFB9B9}"/>
@@ -3137,8 +3137,8 @@
     <dgm:cxn modelId="{3566DF9B-C9AA-4F38-8965-944F6265AC20}" srcId="{4D30DD77-81D7-4E67-974B-0E08966348AA}" destId="{F846C395-E301-4F18-BCE1-229CA8D7EE54}" srcOrd="2" destOrd="0" parTransId="{DEF0765C-EF1B-4FA6-A47C-7B55F753A4C9}" sibTransId="{7F5C0F62-227A-47F6-9A9A-10300A76F3F0}"/>
     <dgm:cxn modelId="{EBD53AC3-3656-4D9F-ABCD-76EC4005867D}" type="presOf" srcId="{A96FDC53-DB34-4D6A-834A-3DF6FDD23237}" destId="{8A244A91-436A-40E9-A942-1B0E9E89208F}" srcOrd="0" destOrd="4" presId="urn:microsoft.com/office/officeart/2005/8/layout/chevron1"/>
     <dgm:cxn modelId="{99211D89-2112-42AC-B32E-22B869FA7BC1}" type="presOf" srcId="{09B54E2C-2A2F-40BF-BB8A-45E153ABBF82}" destId="{6B847F7A-43D7-4D12-B68D-C4F949358D9C}" srcOrd="0" destOrd="1" presId="urn:microsoft.com/office/officeart/2005/8/layout/chevron1"/>
+    <dgm:cxn modelId="{8F197F4D-18AD-4A5E-8E0E-4CE74FC1C834}" type="presOf" srcId="{F846C395-E301-4F18-BCE1-229CA8D7EE54}" destId="{0642C37F-FB30-4846-BE4B-D2F52B6BEEBA}" srcOrd="0" destOrd="6" presId="urn:microsoft.com/office/officeart/2005/8/layout/chevron1"/>
     <dgm:cxn modelId="{A94C0C18-1892-464D-915F-8DFA772049F1}" srcId="{5AA2EE81-2B46-4E7C-8151-C5ADBC1E9B06}" destId="{60F2ED96-A630-4061-8FAC-FBCC79570DA2}" srcOrd="0" destOrd="0" parTransId="{2D27466A-68B4-41EF-AF8D-820983E79127}" sibTransId="{5F6AAD43-ED43-4F02-9C15-B1C6EB80AFDB}"/>
-    <dgm:cxn modelId="{8F197F4D-18AD-4A5E-8E0E-4CE74FC1C834}" type="presOf" srcId="{F846C395-E301-4F18-BCE1-229CA8D7EE54}" destId="{0642C37F-FB30-4846-BE4B-D2F52B6BEEBA}" srcOrd="0" destOrd="6" presId="urn:microsoft.com/office/officeart/2005/8/layout/chevron1"/>
     <dgm:cxn modelId="{B3562E10-DDA6-4BCD-9B37-3417C8026321}" type="presOf" srcId="{EB34FB77-C8F3-42AA-94E5-2EB3D690701A}" destId="{0642C37F-FB30-4846-BE4B-D2F52B6BEEBA}" srcOrd="0" destOrd="4" presId="urn:microsoft.com/office/officeart/2005/8/layout/chevron1"/>
     <dgm:cxn modelId="{704903FE-3010-410B-B103-94F277CBB1E2}" srcId="{4D30DD77-81D7-4E67-974B-0E08966348AA}" destId="{2048D61B-9E1D-4EF9-8274-0AE3554F1FFE}" srcOrd="1" destOrd="0" parTransId="{1333E74D-0309-4E1E-9488-C1139153B6DB}" sibTransId="{BB91244B-9776-4462-A68D-C8A48FD877E3}"/>
     <dgm:cxn modelId="{B9C1FAD9-56FD-4FE6-A34D-2A4F339A7E0D}" type="presParOf" srcId="{83E3395D-F688-44F0-A3DC-DD441AD38D8F}" destId="{8215CFAC-EA9F-49D5-A686-71EC4973729C}" srcOrd="0" destOrd="0" presId="urn:microsoft.com/office/officeart/2005/8/layout/chevron1"/>
@@ -7996,7 +7996,7 @@
           <a:p>
             <a:fld id="{2E309023-AF2B-4043-B228-F191CADC9BB1}" type="datetimeFigureOut">
               <a:rPr lang="en-IN" smtClean="0"/>
-              <a:t>02-02-2019</a:t>
+              <a:t>03-02-2019</a:t>
             </a:fld>
             <a:endParaRPr lang="en-IN"/>
           </a:p>
@@ -8395,7 +8395,7 @@
           <a:p>
             <a:fld id="{70C018FE-C8D6-4A9C-A702-41F1E0C1C452}" type="datetimeFigureOut">
               <a:rPr lang="en-IN" smtClean="0"/>
-              <a:t>02-02-2019</a:t>
+              <a:t>03-02-2019</a:t>
             </a:fld>
             <a:endParaRPr lang="en-IN"/>
           </a:p>
@@ -8565,7 +8565,7 @@
           <a:p>
             <a:fld id="{70C018FE-C8D6-4A9C-A702-41F1E0C1C452}" type="datetimeFigureOut">
               <a:rPr lang="en-IN" smtClean="0"/>
-              <a:t>02-02-2019</a:t>
+              <a:t>03-02-2019</a:t>
             </a:fld>
             <a:endParaRPr lang="en-IN"/>
           </a:p>
@@ -8745,7 +8745,7 @@
           <a:p>
             <a:fld id="{70C018FE-C8D6-4A9C-A702-41F1E0C1C452}" type="datetimeFigureOut">
               <a:rPr lang="en-IN" smtClean="0"/>
-              <a:t>02-02-2019</a:t>
+              <a:t>03-02-2019</a:t>
             </a:fld>
             <a:endParaRPr lang="en-IN"/>
           </a:p>
@@ -9177,7 +9177,7 @@
           <a:p>
             <a:fld id="{70C018FE-C8D6-4A9C-A702-41F1E0C1C452}" type="datetimeFigureOut">
               <a:rPr lang="en-IN" smtClean="0"/>
-              <a:t>02-02-2019</a:t>
+              <a:t>03-02-2019</a:t>
             </a:fld>
             <a:endParaRPr lang="en-IN"/>
           </a:p>
@@ -9409,7 +9409,7 @@
           <a:p>
             <a:fld id="{70C018FE-C8D6-4A9C-A702-41F1E0C1C452}" type="datetimeFigureOut">
               <a:rPr lang="en-IN" smtClean="0"/>
-              <a:t>02-02-2019</a:t>
+              <a:t>03-02-2019</a:t>
             </a:fld>
             <a:endParaRPr lang="en-IN"/>
           </a:p>
@@ -9776,7 +9776,7 @@
           <a:p>
             <a:fld id="{70C018FE-C8D6-4A9C-A702-41F1E0C1C452}" type="datetimeFigureOut">
               <a:rPr lang="en-IN" smtClean="0"/>
-              <a:t>02-02-2019</a:t>
+              <a:t>03-02-2019</a:t>
             </a:fld>
             <a:endParaRPr lang="en-IN"/>
           </a:p>
@@ -9894,7 +9894,7 @@
           <a:p>
             <a:fld id="{70C018FE-C8D6-4A9C-A702-41F1E0C1C452}" type="datetimeFigureOut">
               <a:rPr lang="en-IN" smtClean="0"/>
-              <a:t>02-02-2019</a:t>
+              <a:t>03-02-2019</a:t>
             </a:fld>
             <a:endParaRPr lang="en-IN"/>
           </a:p>
@@ -9989,7 +9989,7 @@
           <a:p>
             <a:fld id="{70C018FE-C8D6-4A9C-A702-41F1E0C1C452}" type="datetimeFigureOut">
               <a:rPr lang="en-IN" smtClean="0"/>
-              <a:t>02-02-2019</a:t>
+              <a:t>03-02-2019</a:t>
             </a:fld>
             <a:endParaRPr lang="en-IN"/>
           </a:p>
@@ -10265,7 +10265,7 @@
           <a:p>
             <a:fld id="{70C018FE-C8D6-4A9C-A702-41F1E0C1C452}" type="datetimeFigureOut">
               <a:rPr lang="en-IN" smtClean="0"/>
-              <a:t>02-02-2019</a:t>
+              <a:t>03-02-2019</a:t>
             </a:fld>
             <a:endParaRPr lang="en-IN"/>
           </a:p>
@@ -10522,7 +10522,7 @@
           <a:p>
             <a:fld id="{70C018FE-C8D6-4A9C-A702-41F1E0C1C452}" type="datetimeFigureOut">
               <a:rPr lang="en-IN" smtClean="0"/>
-              <a:t>02-02-2019</a:t>
+              <a:t>03-02-2019</a:t>
             </a:fld>
             <a:endParaRPr lang="en-IN"/>
           </a:p>
@@ -10733,7 +10733,7 @@
           <a:p>
             <a:fld id="{70C018FE-C8D6-4A9C-A702-41F1E0C1C452}" type="datetimeFigureOut">
               <a:rPr lang="en-IN" smtClean="0"/>
-              <a:t>02-02-2019</a:t>
+              <a:t>03-02-2019</a:t>
             </a:fld>
             <a:endParaRPr lang="en-IN" dirty="0"/>
           </a:p>
@@ -13840,11 +13840,7 @@
           <a:p>
             <a:r>
               <a:rPr lang="en-US" sz="1600" dirty="0" smtClean="0"/>
-              <a:t>Box </a:t>
-            </a:r>
-            <a:r>
-              <a:rPr lang="en-US" sz="1600" dirty="0" smtClean="0"/>
-              <a:t>plot - Univariate</a:t>
+              <a:t>Box plot - Univariate</a:t>
             </a:r>
             <a:endParaRPr lang="en-US" sz="1600" dirty="0"/>
           </a:p>
@@ -14996,7 +14992,6 @@
                 <a:rPr lang="en-US" sz="1200" dirty="0"/>
                 <a:t>:Number of derogatory public records: we found that if there is a record of derogatory public records present for a loan applicant that substantially increases the tendency for default. </a:t>
               </a:r>
-              <a:endParaRPr lang="en-US" sz="1200" dirty="0"/>
             </a:p>
           </p:txBody>
         </p:sp>
@@ -15118,7 +15113,6 @@
                 <a:rPr lang="en-US" sz="1200" dirty="0"/>
                 <a:t>: The number of payments on the loan: higher terms lead to more defaults. </a:t>
               </a:r>
-              <a:endParaRPr lang="en-US" sz="1200" dirty="0"/>
             </a:p>
             <a:p>
               <a:pPr marL="171450" indent="-171450">
@@ -15156,7 +15150,6 @@
                 <a:rPr lang="en-US" sz="1200" dirty="0"/>
                 <a:t> : The number of inquiries in past 6 months (excluding auto and mortgage inquiries) : The number of inquiries in past 6 months: we found that tendency to default increases as number of inquiries in past 6 months increases beyond 2, this suggests an evidence of 'credit seeking behavior' on part of loan applicant. </a:t>
               </a:r>
-              <a:endParaRPr lang="en-US" sz="1200" dirty="0"/>
             </a:p>
           </p:txBody>
         </p:sp>
@@ -15401,19 +15394,7 @@
             </a:r>
             <a:r>
               <a:rPr lang="en-US" dirty="0" smtClean="0"/>
-              <a:t>amount </a:t>
-            </a:r>
-            <a:r>
-              <a:rPr lang="en-US" dirty="0" smtClean="0"/>
-              <a:t>/reduce </a:t>
-            </a:r>
-            <a:r>
-              <a:rPr lang="en-US" dirty="0" smtClean="0"/>
-              <a:t>loan </a:t>
-            </a:r>
-            <a:r>
-              <a:rPr lang="en-US" dirty="0" smtClean="0"/>
-              <a:t>term for above cases</a:t>
+              <a:t>amount /reduce loan term for above cases</a:t>
             </a:r>
             <a:endParaRPr lang="en-US" dirty="0"/>
           </a:p>
@@ -16303,10 +16284,17 @@
           <a:lstStyle/>
           <a:p>
             <a:r>
+              <a:rPr lang="en-US" dirty="0"/>
+              <a:t>Data Analysis: </a:t>
+            </a:r>
+            <a:r>
               <a:rPr lang="en-US" dirty="0" smtClean="0"/>
-              <a:t>Data Analysis : Most Impacting Variables</a:t>
-            </a:r>
-            <a:endParaRPr lang="en-US" dirty="0"/>
+              <a:t>Other Impacting </a:t>
+            </a:r>
+            <a:r>
+              <a:rPr lang="en-US" dirty="0"/>
+              <a:t>Variables</a:t>
+            </a:r>
           </a:p>
         </p:txBody>
       </p:sp>
@@ -16322,20 +16310,37 @@
         </p:nvSpPr>
         <p:spPr>
           <a:xfrm>
-            <a:off x="475288" y="1402788"/>
-            <a:ext cx="11168742" cy="369742"/>
+            <a:off x="1344386" y="1366898"/>
+            <a:ext cx="8636192" cy="585025"/>
           </a:xfrm>
         </p:spPr>
         <p:txBody>
           <a:bodyPr>
-            <a:normAutofit/>
+            <a:normAutofit fontScale="92500" lnSpcReduction="10000"/>
           </a:bodyPr>
           <a:lstStyle/>
           <a:p>
-            <a:r>
-              <a:rPr lang="en-US" sz="1600" dirty="0" smtClean="0"/>
-              <a:t>We believe the following variables impact the loan status (Charged off/Fully paid) the most</a:t>
-            </a:r>
+            <a:pPr marL="0" indent="0">
+              <a:buNone/>
+            </a:pPr>
+            <a:r>
+              <a:rPr lang="en-US" sz="1600" dirty="0"/>
+              <a:t>Below variables also impact the loan status (Charged off/Fully paid) the most. </a:t>
+            </a:r>
+          </a:p>
+          <a:p>
+            <a:pPr marL="0" indent="0">
+              <a:buNone/>
+            </a:pPr>
+            <a:r>
+              <a:rPr lang="en-US" sz="1600" dirty="0"/>
+              <a:t>These can be looked upon at lower priority but needs attention.</a:t>
+            </a:r>
+          </a:p>
+          <a:p>
+            <a:pPr marL="0" indent="0">
+              <a:buNone/>
+            </a:pPr>
             <a:endParaRPr lang="en-US" sz="1600" dirty="0"/>
           </a:p>
         </p:txBody>
@@ -16348,8 +16353,8 @@
         </p:nvSpPr>
         <p:spPr>
           <a:xfrm>
-            <a:off x="1344386" y="1728782"/>
-            <a:ext cx="2743200" cy="1058795"/>
+            <a:off x="1344386" y="2024647"/>
+            <a:ext cx="8636193" cy="1058795"/>
           </a:xfrm>
           <a:prstGeom prst="rect">
             <a:avLst/>
@@ -16380,10 +16385,25 @@
               <a:buChar char="•"/>
             </a:pPr>
             <a:r>
-              <a:rPr lang="en-US" sz="1400" dirty="0" err="1" smtClean="0"/>
+              <a:rPr lang="en-US" sz="1400" b="1" dirty="0"/>
+              <a:t>Employee Length [</a:t>
+            </a:r>
+            <a:r>
+              <a:rPr lang="en-US" sz="1400" b="1" dirty="0" err="1"/>
               <a:t>emp_length</a:t>
             </a:r>
-            <a:endParaRPr lang="en-US" sz="1400" dirty="0"/>
+            <a:r>
+              <a:rPr lang="en-US" sz="1400" b="1" dirty="0"/>
+              <a:t>]: </a:t>
+            </a:r>
+            <a:r>
+              <a:rPr lang="en-US" sz="1400" dirty="0">
+                <a:solidFill>
+                  <a:schemeClr val="bg1"/>
+                </a:solidFill>
+              </a:rPr>
+              <a:t>There is a possibility of default where the customer is not employed (‘NA’) or have experience &gt;10 years</a:t>
+            </a:r>
           </a:p>
           <a:p>
             <a:pPr marL="171450" indent="-171450">
@@ -16391,32 +16411,29 @@
               <a:buChar char="•"/>
             </a:pPr>
             <a:r>
-              <a:rPr lang="en-US" sz="1400" dirty="0" err="1" smtClean="0"/>
+              <a:rPr lang="en-US" sz="1400" b="1" dirty="0" err="1"/>
+              <a:t>Earlist</a:t>
+            </a:r>
+            <a:r>
+              <a:rPr lang="en-US" sz="1400" b="1" dirty="0"/>
+              <a:t> credit line [</a:t>
+            </a:r>
+            <a:r>
+              <a:rPr lang="en-US" sz="1400" b="1" dirty="0" err="1"/>
               <a:t>earliest_cr_line</a:t>
             </a:r>
             <a:r>
-              <a:rPr lang="en-US" sz="1400" dirty="0" smtClean="0"/>
-              <a:t> </a:t>
-            </a:r>
-            <a:r>
-              <a:rPr lang="en-US" sz="1400" dirty="0"/>
-              <a:t>- charged off proportion increasing from </a:t>
-            </a:r>
-            <a:r>
-              <a:rPr lang="en-US" sz="1400" dirty="0" smtClean="0"/>
-              <a:t>2004</a:t>
-            </a:r>
-          </a:p>
-          <a:p>
-            <a:pPr marL="171450" indent="-171450">
-              <a:buFont typeface="Arial" panose="020B0604020202020204" pitchFamily="34" charset="0"/>
-              <a:buChar char="•"/>
-            </a:pPr>
-            <a:r>
-              <a:rPr lang="en-US" sz="1400" dirty="0" err="1" smtClean="0"/>
-              <a:t>dti</a:t>
-            </a:r>
-            <a:endParaRPr lang="en-US" sz="1400" dirty="0"/>
+              <a:rPr lang="en-US" sz="1400" b="1" dirty="0"/>
+              <a:t>]: </a:t>
+            </a:r>
+            <a:r>
+              <a:rPr lang="en-US" sz="1400" dirty="0">
+                <a:solidFill>
+                  <a:schemeClr val="bg2"/>
+                </a:solidFill>
+              </a:rPr>
+              <a:t>The month the borrower's earliest reported credit line was opened : charged off proportion increasing from 2004</a:t>
+            </a:r>
           </a:p>
         </p:txBody>
       </p:sp>
@@ -16427,9 +16444,9 @@
           <p:nvPr/>
         </p:nvSpPr>
         <p:spPr>
-          <a:xfrm>
-            <a:off x="1344386" y="2816151"/>
-            <a:ext cx="2743200" cy="274320"/>
+          <a:xfrm rot="16200000">
+            <a:off x="674089" y="2414463"/>
+            <a:ext cx="1060704" cy="274320"/>
           </a:xfrm>
           <a:prstGeom prst="rect">
             <a:avLst/>
@@ -16462,10 +16479,9 @@
           <a:p>
             <a:pPr algn="ctr"/>
             <a:r>
-              <a:rPr lang="en-US" dirty="0" smtClean="0"/>
+              <a:rPr lang="en-US" sz="1600" dirty="0"/>
               <a:t>Customer</a:t>
             </a:r>
-            <a:endParaRPr lang="en-US" dirty="0"/>
           </a:p>
         </p:txBody>
       </p:sp>
@@ -16477,8 +16493,8 @@
         </p:nvSpPr>
         <p:spPr>
           <a:xfrm>
-            <a:off x="4525736" y="1728782"/>
-            <a:ext cx="2743200" cy="1058795"/>
+            <a:off x="1354114" y="3541123"/>
+            <a:ext cx="8636192" cy="1058795"/>
           </a:xfrm>
           <a:prstGeom prst="rect">
             <a:avLst/>
@@ -16512,10 +16528,17 @@
               <a:buChar char="•"/>
             </a:pPr>
             <a:r>
-              <a:rPr lang="en-US" sz="1400" dirty="0" smtClean="0"/>
-              <a:t>purpose</a:t>
-            </a:r>
-            <a:endParaRPr lang="en-US" sz="1400" dirty="0"/>
+              <a:rPr lang="en-US" sz="1400" b="1" dirty="0"/>
+              <a:t>Purpose [purpose]: </a:t>
+            </a:r>
+            <a:r>
+              <a:rPr lang="en-US" sz="1400" dirty="0">
+                <a:solidFill>
+                  <a:schemeClr val="bg2"/>
+                </a:solidFill>
+              </a:rPr>
+              <a:t>Few purposes for loan have a higher tendency for default like small business, renewable energy, education and others. This might be due to risk associated with these ventures.</a:t>
+            </a:r>
           </a:p>
         </p:txBody>
       </p:sp>
@@ -16526,9 +16549,9 @@
           <p:nvPr/>
         </p:nvSpPr>
         <p:spPr>
-          <a:xfrm>
-            <a:off x="4525736" y="2816151"/>
-            <a:ext cx="2743200" cy="274320"/>
+          <a:xfrm rot="16200000">
+            <a:off x="676873" y="3934315"/>
+            <a:ext cx="1060704" cy="274320"/>
           </a:xfrm>
           <a:prstGeom prst="rect">
             <a:avLst/>
@@ -16561,10 +16584,9 @@
           <a:p>
             <a:pPr algn="ctr"/>
             <a:r>
-              <a:rPr lang="en-US" dirty="0" smtClean="0"/>
+              <a:rPr lang="en-US" dirty="0"/>
               <a:t>Loan </a:t>
             </a:r>
-            <a:endParaRPr lang="en-US" dirty="0"/>
           </a:p>
         </p:txBody>
       </p:sp>
@@ -16576,8 +16598,8 @@
         </p:nvSpPr>
         <p:spPr>
           <a:xfrm>
-            <a:off x="7707086" y="1728782"/>
-            <a:ext cx="2743200" cy="1058795"/>
+            <a:off x="1344386" y="5065859"/>
+            <a:ext cx="8636192" cy="1058795"/>
           </a:xfrm>
           <a:prstGeom prst="rect">
             <a:avLst/>
@@ -16611,16 +16633,32 @@
               <a:buChar char="•"/>
             </a:pPr>
             <a:r>
-              <a:rPr lang="en-US" sz="1400" dirty="0" err="1"/>
-              <a:t>annual_installment</a:t>
-            </a:r>
-            <a:r>
-              <a:rPr lang="en-US" sz="1400" dirty="0"/>
-              <a:t> over </a:t>
-            </a:r>
-            <a:r>
-              <a:rPr lang="en-US" sz="1400" dirty="0" err="1"/>
-              <a:t>annual_income</a:t>
+              <a:rPr lang="en-US" sz="1400" b="1" dirty="0"/>
+              <a:t>Annual Installment over annual income [installment over </a:t>
+            </a:r>
+            <a:r>
+              <a:rPr lang="en-US" sz="1400" b="1" dirty="0" err="1"/>
+              <a:t>annual_inc</a:t>
+            </a:r>
+            <a:r>
+              <a:rPr lang="en-US" sz="1400" b="1" dirty="0"/>
+              <a:t>]: </a:t>
+            </a:r>
+            <a:r>
+              <a:rPr lang="en-US" sz="1400" b="1" dirty="0">
+                <a:solidFill>
+                  <a:schemeClr val="bg2"/>
+                </a:solidFill>
+              </a:rPr>
+              <a:t>It</a:t>
+            </a:r>
+            <a:r>
+              <a:rPr lang="en-US" sz="1400" dirty="0">
+                <a:solidFill>
+                  <a:schemeClr val="bg2"/>
+                </a:solidFill>
+              </a:rPr>
+              <a:t> refers to the capacity of an individual to pay for the loan. It appears that if the value is less it rises the chances of the borrower to default.</a:t>
             </a:r>
             <a:endParaRPr lang="en-US" sz="1400" dirty="0"/>
           </a:p>
@@ -16636,9 +16674,9 @@
           <p:nvPr/>
         </p:nvSpPr>
         <p:spPr>
-          <a:xfrm>
-            <a:off x="7707085" y="2816151"/>
-            <a:ext cx="2743200" cy="274320"/>
+          <a:xfrm rot="16200000">
+            <a:off x="676873" y="5457142"/>
+            <a:ext cx="1060704" cy="274320"/>
           </a:xfrm>
           <a:prstGeom prst="rect">
             <a:avLst/>
@@ -16678,1051 +16716,16 @@
           <a:p>
             <a:pPr algn="ctr"/>
             <a:r>
-              <a:rPr lang="en-US" dirty="0" smtClean="0"/>
+              <a:rPr lang="en-US" dirty="0"/>
               <a:t>Derived</a:t>
             </a:r>
-            <a:endParaRPr lang="en-US" dirty="0"/>
-          </a:p>
-        </p:txBody>
-      </p:sp>
-      <p:sp>
-        <p:nvSpPr>
-          <p:cNvPr id="10" name="Content Placeholder 2"/>
-          <p:cNvSpPr txBox="1">
-            <a:spLocks/>
-          </p:cNvSpPr>
-          <p:nvPr/>
-        </p:nvSpPr>
-        <p:spPr>
-          <a:xfrm>
-            <a:off x="670551" y="3072669"/>
-            <a:ext cx="11168742" cy="369742"/>
-          </a:xfrm>
-          <a:prstGeom prst="rect">
-            <a:avLst/>
-          </a:prstGeom>
-        </p:spPr>
-        <p:txBody>
-          <a:bodyPr vert="horz" lIns="91440" tIns="45720" rIns="91440" bIns="45720" rtlCol="0">
-            <a:normAutofit/>
-          </a:bodyPr>
-          <a:lstStyle>
-            <a:lvl1pPr marL="228600" indent="-228600" algn="l" defTabSz="914400" rtl="0" eaLnBrk="1" latinLnBrk="0" hangingPunct="1">
-              <a:lnSpc>
-                <a:spcPct val="90000"/>
-              </a:lnSpc>
-              <a:spcBef>
-                <a:spcPts val="1000"/>
-              </a:spcBef>
-              <a:buFont typeface="Arial" panose="020B0604020202020204" pitchFamily="34" charset="0"/>
-              <a:buChar char="•"/>
-              <a:defRPr sz="2800" kern="1200">
-                <a:solidFill>
-                  <a:schemeClr val="tx1"/>
-                </a:solidFill>
-                <a:latin typeface="Times New Roman" panose="02020603050405020304" pitchFamily="18" charset="0"/>
-                <a:ea typeface="+mn-ea"/>
-                <a:cs typeface="Times New Roman" panose="02020603050405020304" pitchFamily="18" charset="0"/>
-              </a:defRPr>
-            </a:lvl1pPr>
-            <a:lvl2pPr marL="685800" indent="-228600" algn="l" defTabSz="914400" rtl="0" eaLnBrk="1" latinLnBrk="0" hangingPunct="1">
-              <a:lnSpc>
-                <a:spcPct val="90000"/>
-              </a:lnSpc>
-              <a:spcBef>
-                <a:spcPts val="500"/>
-              </a:spcBef>
-              <a:buFont typeface="Arial" panose="020B0604020202020204" pitchFamily="34" charset="0"/>
-              <a:buChar char="•"/>
-              <a:defRPr sz="2400" kern="1200">
-                <a:solidFill>
-                  <a:schemeClr val="tx1"/>
-                </a:solidFill>
-                <a:latin typeface="Times New Roman" panose="02020603050405020304" pitchFamily="18" charset="0"/>
-                <a:ea typeface="+mn-ea"/>
-                <a:cs typeface="Times New Roman" panose="02020603050405020304" pitchFamily="18" charset="0"/>
-              </a:defRPr>
-            </a:lvl2pPr>
-            <a:lvl3pPr marL="1143000" indent="-228600" algn="l" defTabSz="914400" rtl="0" eaLnBrk="1" latinLnBrk="0" hangingPunct="1">
-              <a:lnSpc>
-                <a:spcPct val="90000"/>
-              </a:lnSpc>
-              <a:spcBef>
-                <a:spcPts val="500"/>
-              </a:spcBef>
-              <a:buFont typeface="Arial" panose="020B0604020202020204" pitchFamily="34" charset="0"/>
-              <a:buChar char="•"/>
-              <a:defRPr sz="2000" kern="1200">
-                <a:solidFill>
-                  <a:schemeClr val="tx1"/>
-                </a:solidFill>
-                <a:latin typeface="Times New Roman" panose="02020603050405020304" pitchFamily="18" charset="0"/>
-                <a:ea typeface="+mn-ea"/>
-                <a:cs typeface="Times New Roman" panose="02020603050405020304" pitchFamily="18" charset="0"/>
-              </a:defRPr>
-            </a:lvl3pPr>
-            <a:lvl4pPr marL="1600200" indent="-228600" algn="l" defTabSz="914400" rtl="0" eaLnBrk="1" latinLnBrk="0" hangingPunct="1">
-              <a:lnSpc>
-                <a:spcPct val="90000"/>
-              </a:lnSpc>
-              <a:spcBef>
-                <a:spcPts val="500"/>
-              </a:spcBef>
-              <a:buFont typeface="Arial" panose="020B0604020202020204" pitchFamily="34" charset="0"/>
-              <a:buChar char="•"/>
-              <a:defRPr sz="1800" kern="1200">
-                <a:solidFill>
-                  <a:schemeClr val="tx1"/>
-                </a:solidFill>
-                <a:latin typeface="Times New Roman" panose="02020603050405020304" pitchFamily="18" charset="0"/>
-                <a:ea typeface="+mn-ea"/>
-                <a:cs typeface="Times New Roman" panose="02020603050405020304" pitchFamily="18" charset="0"/>
-              </a:defRPr>
-            </a:lvl4pPr>
-            <a:lvl5pPr marL="2057400" indent="-228600" algn="l" defTabSz="914400" rtl="0" eaLnBrk="1" latinLnBrk="0" hangingPunct="1">
-              <a:lnSpc>
-                <a:spcPct val="90000"/>
-              </a:lnSpc>
-              <a:spcBef>
-                <a:spcPts val="500"/>
-              </a:spcBef>
-              <a:buFont typeface="Arial" panose="020B0604020202020204" pitchFamily="34" charset="0"/>
-              <a:buChar char="•"/>
-              <a:defRPr sz="1800" kern="1200">
-                <a:solidFill>
-                  <a:schemeClr val="tx1"/>
-                </a:solidFill>
-                <a:latin typeface="Times New Roman" panose="02020603050405020304" pitchFamily="18" charset="0"/>
-                <a:ea typeface="+mn-ea"/>
-                <a:cs typeface="Times New Roman" panose="02020603050405020304" pitchFamily="18" charset="0"/>
-              </a:defRPr>
-            </a:lvl5pPr>
-            <a:lvl6pPr marL="2514600" indent="-228600" algn="l" defTabSz="914400" rtl="0" eaLnBrk="1" latinLnBrk="0" hangingPunct="1">
-              <a:lnSpc>
-                <a:spcPct val="90000"/>
-              </a:lnSpc>
-              <a:spcBef>
-                <a:spcPts val="500"/>
-              </a:spcBef>
-              <a:buFont typeface="Arial" panose="020B0604020202020204" pitchFamily="34" charset="0"/>
-              <a:buChar char="•"/>
-              <a:defRPr sz="1800" kern="1200">
-                <a:solidFill>
-                  <a:schemeClr val="tx1"/>
-                </a:solidFill>
-                <a:latin typeface="+mn-lt"/>
-                <a:ea typeface="+mn-ea"/>
-                <a:cs typeface="+mn-cs"/>
-              </a:defRPr>
-            </a:lvl6pPr>
-            <a:lvl7pPr marL="2971800" indent="-228600" algn="l" defTabSz="914400" rtl="0" eaLnBrk="1" latinLnBrk="0" hangingPunct="1">
-              <a:lnSpc>
-                <a:spcPct val="90000"/>
-              </a:lnSpc>
-              <a:spcBef>
-                <a:spcPts val="500"/>
-              </a:spcBef>
-              <a:buFont typeface="Arial" panose="020B0604020202020204" pitchFamily="34" charset="0"/>
-              <a:buChar char="•"/>
-              <a:defRPr sz="1800" kern="1200">
-                <a:solidFill>
-                  <a:schemeClr val="tx1"/>
-                </a:solidFill>
-                <a:latin typeface="+mn-lt"/>
-                <a:ea typeface="+mn-ea"/>
-                <a:cs typeface="+mn-cs"/>
-              </a:defRPr>
-            </a:lvl7pPr>
-            <a:lvl8pPr marL="3429000" indent="-228600" algn="l" defTabSz="914400" rtl="0" eaLnBrk="1" latinLnBrk="0" hangingPunct="1">
-              <a:lnSpc>
-                <a:spcPct val="90000"/>
-              </a:lnSpc>
-              <a:spcBef>
-                <a:spcPts val="500"/>
-              </a:spcBef>
-              <a:buFont typeface="Arial" panose="020B0604020202020204" pitchFamily="34" charset="0"/>
-              <a:buChar char="•"/>
-              <a:defRPr sz="1800" kern="1200">
-                <a:solidFill>
-                  <a:schemeClr val="tx1"/>
-                </a:solidFill>
-                <a:latin typeface="+mn-lt"/>
-                <a:ea typeface="+mn-ea"/>
-                <a:cs typeface="+mn-cs"/>
-              </a:defRPr>
-            </a:lvl8pPr>
-            <a:lvl9pPr marL="3886200" indent="-228600" algn="l" defTabSz="914400" rtl="0" eaLnBrk="1" latinLnBrk="0" hangingPunct="1">
-              <a:lnSpc>
-                <a:spcPct val="90000"/>
-              </a:lnSpc>
-              <a:spcBef>
-                <a:spcPts val="500"/>
-              </a:spcBef>
-              <a:buFont typeface="Arial" panose="020B0604020202020204" pitchFamily="34" charset="0"/>
-              <a:buChar char="•"/>
-              <a:defRPr sz="1800" kern="1200">
-                <a:solidFill>
-                  <a:schemeClr val="tx1"/>
-                </a:solidFill>
-                <a:latin typeface="+mn-lt"/>
-                <a:ea typeface="+mn-ea"/>
-                <a:cs typeface="+mn-cs"/>
-              </a:defRPr>
-            </a:lvl9pPr>
-          </a:lstStyle>
-          <a:p>
-            <a:r>
-              <a:rPr lang="en-US" sz="1600" dirty="0" smtClean="0"/>
-              <a:t>Additional Information: </a:t>
-            </a:r>
-            <a:endParaRPr lang="en-US" sz="1600" dirty="0"/>
-          </a:p>
-        </p:txBody>
-      </p:sp>
-      <p:sp>
-        <p:nvSpPr>
-          <p:cNvPr id="11" name="Rectangle 10"/>
-          <p:cNvSpPr/>
-          <p:nvPr/>
-        </p:nvSpPr>
-        <p:spPr>
-          <a:xfrm>
-            <a:off x="1344386" y="3367954"/>
-            <a:ext cx="2743200" cy="523236"/>
-          </a:xfrm>
-          <a:prstGeom prst="rect">
-            <a:avLst/>
-          </a:prstGeom>
-        </p:spPr>
-        <p:style>
-          <a:lnRef idx="2">
-            <a:schemeClr val="accent1">
-              <a:shade val="50000"/>
-            </a:schemeClr>
-          </a:lnRef>
-          <a:fillRef idx="1">
-            <a:schemeClr val="accent1"/>
-          </a:fillRef>
-          <a:effectRef idx="0">
-            <a:schemeClr val="accent1"/>
-          </a:effectRef>
-          <a:fontRef idx="minor">
-            <a:schemeClr val="lt1"/>
-          </a:fontRef>
-        </p:style>
-        <p:txBody>
-          <a:bodyPr rtlCol="0" anchor="ctr"/>
-          <a:lstStyle/>
-          <a:p>
-            <a:pPr marL="171450" indent="-171450">
-              <a:buFont typeface="Arial" panose="020B0604020202020204" pitchFamily="34" charset="0"/>
-              <a:buChar char="•"/>
-            </a:pPr>
-            <a:r>
-              <a:rPr lang="en-US" sz="1400" dirty="0" err="1"/>
-              <a:t>verification_status</a:t>
-            </a:r>
-            <a:r>
-              <a:rPr lang="en-US" sz="1400" dirty="0"/>
-              <a:t> - process </a:t>
-            </a:r>
-            <a:r>
-              <a:rPr lang="en-US" sz="1400" dirty="0" smtClean="0"/>
-              <a:t>related</a:t>
-            </a:r>
-            <a:endParaRPr lang="en-US" sz="1400" dirty="0"/>
-          </a:p>
-        </p:txBody>
-      </p:sp>
-      <p:sp>
-        <p:nvSpPr>
-          <p:cNvPr id="12" name="Rectangle 11"/>
-          <p:cNvSpPr/>
-          <p:nvPr/>
-        </p:nvSpPr>
-        <p:spPr>
-          <a:xfrm>
-            <a:off x="1344386" y="3919764"/>
-            <a:ext cx="2743200" cy="274320"/>
-          </a:xfrm>
-          <a:prstGeom prst="rect">
-            <a:avLst/>
-          </a:prstGeom>
-          <a:solidFill>
-            <a:schemeClr val="accent1">
-              <a:lumMod val="50000"/>
-            </a:schemeClr>
-          </a:solidFill>
-        </p:spPr>
-        <p:style>
-          <a:lnRef idx="2">
-            <a:schemeClr val="accent1">
-              <a:shade val="50000"/>
-            </a:schemeClr>
-          </a:lnRef>
-          <a:fillRef idx="1">
-            <a:schemeClr val="accent1"/>
-          </a:fillRef>
-          <a:effectRef idx="0">
-            <a:schemeClr val="accent1"/>
-          </a:effectRef>
-          <a:fontRef idx="minor">
-            <a:schemeClr val="lt1"/>
-          </a:fontRef>
-        </p:style>
-        <p:txBody>
-          <a:bodyPr rtlCol="0" anchor="ctr"/>
-          <a:lstStyle/>
-          <a:p>
-            <a:pPr algn="ctr"/>
-            <a:r>
-              <a:rPr lang="en-US" dirty="0" smtClean="0"/>
-              <a:t>Customer</a:t>
-            </a:r>
-            <a:endParaRPr lang="en-US" dirty="0"/>
-          </a:p>
-        </p:txBody>
-      </p:sp>
-      <p:sp>
-        <p:nvSpPr>
-          <p:cNvPr id="13" name="Rectangle 12"/>
-          <p:cNvSpPr/>
-          <p:nvPr/>
-        </p:nvSpPr>
-        <p:spPr>
-          <a:xfrm>
-            <a:off x="4525736" y="3367954"/>
-            <a:ext cx="2743200" cy="523236"/>
-          </a:xfrm>
-          <a:prstGeom prst="rect">
-            <a:avLst/>
-          </a:prstGeom>
-          <a:solidFill>
-            <a:schemeClr val="accent2"/>
-          </a:solidFill>
-        </p:spPr>
-        <p:style>
-          <a:lnRef idx="2">
-            <a:schemeClr val="accent1">
-              <a:shade val="50000"/>
-            </a:schemeClr>
-          </a:lnRef>
-          <a:fillRef idx="1">
-            <a:schemeClr val="accent1"/>
-          </a:fillRef>
-          <a:effectRef idx="0">
-            <a:schemeClr val="accent1"/>
-          </a:effectRef>
-          <a:fontRef idx="minor">
-            <a:schemeClr val="lt1"/>
-          </a:fontRef>
-        </p:style>
-        <p:txBody>
-          <a:bodyPr rtlCol="0" anchor="ctr"/>
-          <a:lstStyle/>
-          <a:p>
-            <a:pPr marL="171450" indent="-171450">
-              <a:buFont typeface="Arial" panose="020B0604020202020204" pitchFamily="34" charset="0"/>
-              <a:buChar char="•"/>
-            </a:pPr>
-            <a:r>
-              <a:rPr lang="en-US" sz="1400" dirty="0" err="1"/>
-              <a:t>issue_d</a:t>
-            </a:r>
-            <a:r>
-              <a:rPr lang="en-US" sz="1400" dirty="0" smtClean="0"/>
-              <a:t> </a:t>
-            </a:r>
-            <a:r>
-              <a:rPr lang="en-US" sz="1400" dirty="0"/>
-              <a:t>- process </a:t>
-            </a:r>
-            <a:r>
-              <a:rPr lang="en-US" sz="1400" dirty="0" smtClean="0"/>
-              <a:t>related</a:t>
-            </a:r>
-            <a:endParaRPr lang="en-US" sz="1400" dirty="0"/>
-          </a:p>
-        </p:txBody>
-      </p:sp>
-      <p:sp>
-        <p:nvSpPr>
-          <p:cNvPr id="14" name="Rectangle 13"/>
-          <p:cNvSpPr/>
-          <p:nvPr/>
-        </p:nvSpPr>
-        <p:spPr>
-          <a:xfrm>
-            <a:off x="4525736" y="3919764"/>
-            <a:ext cx="2743200" cy="274320"/>
-          </a:xfrm>
-          <a:prstGeom prst="rect">
-            <a:avLst/>
-          </a:prstGeom>
-          <a:solidFill>
-            <a:schemeClr val="accent2">
-              <a:lumMod val="50000"/>
-            </a:schemeClr>
-          </a:solidFill>
-        </p:spPr>
-        <p:style>
-          <a:lnRef idx="2">
-            <a:schemeClr val="accent1">
-              <a:shade val="50000"/>
-            </a:schemeClr>
-          </a:lnRef>
-          <a:fillRef idx="1">
-            <a:schemeClr val="accent1"/>
-          </a:fillRef>
-          <a:effectRef idx="0">
-            <a:schemeClr val="accent1"/>
-          </a:effectRef>
-          <a:fontRef idx="minor">
-            <a:schemeClr val="lt1"/>
-          </a:fontRef>
-        </p:style>
-        <p:txBody>
-          <a:bodyPr rtlCol="0" anchor="ctr"/>
-          <a:lstStyle/>
-          <a:p>
-            <a:pPr algn="ctr"/>
-            <a:r>
-              <a:rPr lang="en-US" dirty="0" smtClean="0"/>
-              <a:t>Loan </a:t>
-            </a:r>
-            <a:endParaRPr lang="en-US" dirty="0"/>
-          </a:p>
-        </p:txBody>
-      </p:sp>
-      <p:sp>
-        <p:nvSpPr>
-          <p:cNvPr id="15" name="Content Placeholder 2"/>
-          <p:cNvSpPr txBox="1">
-            <a:spLocks/>
-          </p:cNvSpPr>
-          <p:nvPr/>
-        </p:nvSpPr>
-        <p:spPr>
-          <a:xfrm>
-            <a:off x="670551" y="4222658"/>
-            <a:ext cx="11168742" cy="369742"/>
-          </a:xfrm>
-          <a:prstGeom prst="rect">
-            <a:avLst/>
-          </a:prstGeom>
-        </p:spPr>
-        <p:txBody>
-          <a:bodyPr vert="horz" lIns="91440" tIns="45720" rIns="91440" bIns="45720" rtlCol="0">
-            <a:normAutofit/>
-          </a:bodyPr>
-          <a:lstStyle>
-            <a:lvl1pPr marL="228600" indent="-228600" algn="l" defTabSz="914400" rtl="0" eaLnBrk="1" latinLnBrk="0" hangingPunct="1">
-              <a:lnSpc>
-                <a:spcPct val="90000"/>
-              </a:lnSpc>
-              <a:spcBef>
-                <a:spcPts val="1000"/>
-              </a:spcBef>
-              <a:buFont typeface="Arial" panose="020B0604020202020204" pitchFamily="34" charset="0"/>
-              <a:buChar char="•"/>
-              <a:defRPr sz="2800" kern="1200">
-                <a:solidFill>
-                  <a:schemeClr val="tx1"/>
-                </a:solidFill>
-                <a:latin typeface="Times New Roman" panose="02020603050405020304" pitchFamily="18" charset="0"/>
-                <a:ea typeface="+mn-ea"/>
-                <a:cs typeface="Times New Roman" panose="02020603050405020304" pitchFamily="18" charset="0"/>
-              </a:defRPr>
-            </a:lvl1pPr>
-            <a:lvl2pPr marL="685800" indent="-228600" algn="l" defTabSz="914400" rtl="0" eaLnBrk="1" latinLnBrk="0" hangingPunct="1">
-              <a:lnSpc>
-                <a:spcPct val="90000"/>
-              </a:lnSpc>
-              <a:spcBef>
-                <a:spcPts val="500"/>
-              </a:spcBef>
-              <a:buFont typeface="Arial" panose="020B0604020202020204" pitchFamily="34" charset="0"/>
-              <a:buChar char="•"/>
-              <a:defRPr sz="2400" kern="1200">
-                <a:solidFill>
-                  <a:schemeClr val="tx1"/>
-                </a:solidFill>
-                <a:latin typeface="Times New Roman" panose="02020603050405020304" pitchFamily="18" charset="0"/>
-                <a:ea typeface="+mn-ea"/>
-                <a:cs typeface="Times New Roman" panose="02020603050405020304" pitchFamily="18" charset="0"/>
-              </a:defRPr>
-            </a:lvl2pPr>
-            <a:lvl3pPr marL="1143000" indent="-228600" algn="l" defTabSz="914400" rtl="0" eaLnBrk="1" latinLnBrk="0" hangingPunct="1">
-              <a:lnSpc>
-                <a:spcPct val="90000"/>
-              </a:lnSpc>
-              <a:spcBef>
-                <a:spcPts val="500"/>
-              </a:spcBef>
-              <a:buFont typeface="Arial" panose="020B0604020202020204" pitchFamily="34" charset="0"/>
-              <a:buChar char="•"/>
-              <a:defRPr sz="2000" kern="1200">
-                <a:solidFill>
-                  <a:schemeClr val="tx1"/>
-                </a:solidFill>
-                <a:latin typeface="Times New Roman" panose="02020603050405020304" pitchFamily="18" charset="0"/>
-                <a:ea typeface="+mn-ea"/>
-                <a:cs typeface="Times New Roman" panose="02020603050405020304" pitchFamily="18" charset="0"/>
-              </a:defRPr>
-            </a:lvl3pPr>
-            <a:lvl4pPr marL="1600200" indent="-228600" algn="l" defTabSz="914400" rtl="0" eaLnBrk="1" latinLnBrk="0" hangingPunct="1">
-              <a:lnSpc>
-                <a:spcPct val="90000"/>
-              </a:lnSpc>
-              <a:spcBef>
-                <a:spcPts val="500"/>
-              </a:spcBef>
-              <a:buFont typeface="Arial" panose="020B0604020202020204" pitchFamily="34" charset="0"/>
-              <a:buChar char="•"/>
-              <a:defRPr sz="1800" kern="1200">
-                <a:solidFill>
-                  <a:schemeClr val="tx1"/>
-                </a:solidFill>
-                <a:latin typeface="Times New Roman" panose="02020603050405020304" pitchFamily="18" charset="0"/>
-                <a:ea typeface="+mn-ea"/>
-                <a:cs typeface="Times New Roman" panose="02020603050405020304" pitchFamily="18" charset="0"/>
-              </a:defRPr>
-            </a:lvl4pPr>
-            <a:lvl5pPr marL="2057400" indent="-228600" algn="l" defTabSz="914400" rtl="0" eaLnBrk="1" latinLnBrk="0" hangingPunct="1">
-              <a:lnSpc>
-                <a:spcPct val="90000"/>
-              </a:lnSpc>
-              <a:spcBef>
-                <a:spcPts val="500"/>
-              </a:spcBef>
-              <a:buFont typeface="Arial" panose="020B0604020202020204" pitchFamily="34" charset="0"/>
-              <a:buChar char="•"/>
-              <a:defRPr sz="1800" kern="1200">
-                <a:solidFill>
-                  <a:schemeClr val="tx1"/>
-                </a:solidFill>
-                <a:latin typeface="Times New Roman" panose="02020603050405020304" pitchFamily="18" charset="0"/>
-                <a:ea typeface="+mn-ea"/>
-                <a:cs typeface="Times New Roman" panose="02020603050405020304" pitchFamily="18" charset="0"/>
-              </a:defRPr>
-            </a:lvl5pPr>
-            <a:lvl6pPr marL="2514600" indent="-228600" algn="l" defTabSz="914400" rtl="0" eaLnBrk="1" latinLnBrk="0" hangingPunct="1">
-              <a:lnSpc>
-                <a:spcPct val="90000"/>
-              </a:lnSpc>
-              <a:spcBef>
-                <a:spcPts val="500"/>
-              </a:spcBef>
-              <a:buFont typeface="Arial" panose="020B0604020202020204" pitchFamily="34" charset="0"/>
-              <a:buChar char="•"/>
-              <a:defRPr sz="1800" kern="1200">
-                <a:solidFill>
-                  <a:schemeClr val="tx1"/>
-                </a:solidFill>
-                <a:latin typeface="+mn-lt"/>
-                <a:ea typeface="+mn-ea"/>
-                <a:cs typeface="+mn-cs"/>
-              </a:defRPr>
-            </a:lvl6pPr>
-            <a:lvl7pPr marL="2971800" indent="-228600" algn="l" defTabSz="914400" rtl="0" eaLnBrk="1" latinLnBrk="0" hangingPunct="1">
-              <a:lnSpc>
-                <a:spcPct val="90000"/>
-              </a:lnSpc>
-              <a:spcBef>
-                <a:spcPts val="500"/>
-              </a:spcBef>
-              <a:buFont typeface="Arial" panose="020B0604020202020204" pitchFamily="34" charset="0"/>
-              <a:buChar char="•"/>
-              <a:defRPr sz="1800" kern="1200">
-                <a:solidFill>
-                  <a:schemeClr val="tx1"/>
-                </a:solidFill>
-                <a:latin typeface="+mn-lt"/>
-                <a:ea typeface="+mn-ea"/>
-                <a:cs typeface="+mn-cs"/>
-              </a:defRPr>
-            </a:lvl7pPr>
-            <a:lvl8pPr marL="3429000" indent="-228600" algn="l" defTabSz="914400" rtl="0" eaLnBrk="1" latinLnBrk="0" hangingPunct="1">
-              <a:lnSpc>
-                <a:spcPct val="90000"/>
-              </a:lnSpc>
-              <a:spcBef>
-                <a:spcPts val="500"/>
-              </a:spcBef>
-              <a:buFont typeface="Arial" panose="020B0604020202020204" pitchFamily="34" charset="0"/>
-              <a:buChar char="•"/>
-              <a:defRPr sz="1800" kern="1200">
-                <a:solidFill>
-                  <a:schemeClr val="tx1"/>
-                </a:solidFill>
-                <a:latin typeface="+mn-lt"/>
-                <a:ea typeface="+mn-ea"/>
-                <a:cs typeface="+mn-cs"/>
-              </a:defRPr>
-            </a:lvl8pPr>
-            <a:lvl9pPr marL="3886200" indent="-228600" algn="l" defTabSz="914400" rtl="0" eaLnBrk="1" latinLnBrk="0" hangingPunct="1">
-              <a:lnSpc>
-                <a:spcPct val="90000"/>
-              </a:lnSpc>
-              <a:spcBef>
-                <a:spcPts val="500"/>
-              </a:spcBef>
-              <a:buFont typeface="Arial" panose="020B0604020202020204" pitchFamily="34" charset="0"/>
-              <a:buChar char="•"/>
-              <a:defRPr sz="1800" kern="1200">
-                <a:solidFill>
-                  <a:schemeClr val="tx1"/>
-                </a:solidFill>
-                <a:latin typeface="+mn-lt"/>
-                <a:ea typeface="+mn-ea"/>
-                <a:cs typeface="+mn-cs"/>
-              </a:defRPr>
-            </a:lvl9pPr>
-          </a:lstStyle>
-          <a:p>
-            <a:r>
-              <a:rPr lang="en-US" sz="1600" dirty="0" smtClean="0"/>
-              <a:t>Other Significant Variables</a:t>
-            </a:r>
-            <a:endParaRPr lang="en-US" sz="1600" dirty="0"/>
-          </a:p>
-        </p:txBody>
-      </p:sp>
-      <p:sp>
-        <p:nvSpPr>
-          <p:cNvPr id="16" name="Rectangle 15"/>
-          <p:cNvSpPr/>
-          <p:nvPr/>
-        </p:nvSpPr>
-        <p:spPr>
-          <a:xfrm>
-            <a:off x="1344385" y="4592401"/>
-            <a:ext cx="2743200" cy="1190642"/>
-          </a:xfrm>
-          <a:prstGeom prst="rect">
-            <a:avLst/>
-          </a:prstGeom>
-        </p:spPr>
-        <p:style>
-          <a:lnRef idx="2">
-            <a:schemeClr val="accent1">
-              <a:shade val="50000"/>
-            </a:schemeClr>
-          </a:lnRef>
-          <a:fillRef idx="1">
-            <a:schemeClr val="accent1"/>
-          </a:fillRef>
-          <a:effectRef idx="0">
-            <a:schemeClr val="accent1"/>
-          </a:effectRef>
-          <a:fontRef idx="minor">
-            <a:schemeClr val="lt1"/>
-          </a:fontRef>
-        </p:style>
-        <p:txBody>
-          <a:bodyPr rtlCol="0" anchor="ctr"/>
-          <a:lstStyle/>
-          <a:p>
-            <a:pPr marL="171450" indent="-171450">
-              <a:buFont typeface="Arial" panose="020B0604020202020204" pitchFamily="34" charset="0"/>
-              <a:buChar char="•"/>
-            </a:pPr>
-            <a:r>
-              <a:rPr lang="en-US" sz="1400" dirty="0" err="1"/>
-              <a:t>addr_state</a:t>
-            </a:r>
-            <a:endParaRPr lang="en-US" sz="1400" dirty="0"/>
-          </a:p>
-          <a:p>
-            <a:pPr marL="171450" indent="-171450">
-              <a:buFont typeface="Arial" panose="020B0604020202020204" pitchFamily="34" charset="0"/>
-              <a:buChar char="•"/>
-            </a:pPr>
-            <a:r>
-              <a:rPr lang="en-US" sz="1400" dirty="0" err="1"/>
-              <a:t>dti</a:t>
-            </a:r>
-            <a:endParaRPr lang="en-US" sz="1400" dirty="0"/>
-          </a:p>
-          <a:p>
-            <a:pPr marL="171450" indent="-171450">
-              <a:buFont typeface="Arial" panose="020B0604020202020204" pitchFamily="34" charset="0"/>
-              <a:buChar char="•"/>
-            </a:pPr>
-            <a:r>
-              <a:rPr lang="en-US" sz="1400" dirty="0" err="1"/>
-              <a:t>home_ownership</a:t>
-            </a:r>
-            <a:endParaRPr lang="en-US" sz="1400" dirty="0"/>
-          </a:p>
-          <a:p>
-            <a:pPr marL="171450" indent="-171450">
-              <a:buFont typeface="Arial" panose="020B0604020202020204" pitchFamily="34" charset="0"/>
-              <a:buChar char="•"/>
-            </a:pPr>
-            <a:r>
-              <a:rPr lang="en-US" sz="1400" dirty="0" err="1"/>
-              <a:t>mths_since_last_record</a:t>
-            </a:r>
-            <a:endParaRPr lang="en-US" sz="1400" dirty="0"/>
-          </a:p>
-          <a:p>
-            <a:pPr marL="171450" indent="-171450">
-              <a:buFont typeface="Arial" panose="020B0604020202020204" pitchFamily="34" charset="0"/>
-              <a:buChar char="•"/>
-            </a:pPr>
-            <a:r>
-              <a:rPr lang="en-US" sz="1400" dirty="0" err="1"/>
-              <a:t>total_acc</a:t>
-            </a:r>
-            <a:endParaRPr lang="en-US" sz="1400" dirty="0"/>
-          </a:p>
-        </p:txBody>
-      </p:sp>
-      <p:sp>
-        <p:nvSpPr>
-          <p:cNvPr id="17" name="Rectangle 16"/>
-          <p:cNvSpPr/>
-          <p:nvPr/>
-        </p:nvSpPr>
-        <p:spPr>
-          <a:xfrm>
-            <a:off x="1344385" y="5811616"/>
-            <a:ext cx="2743200" cy="274320"/>
-          </a:xfrm>
-          <a:prstGeom prst="rect">
-            <a:avLst/>
-          </a:prstGeom>
-          <a:solidFill>
-            <a:schemeClr val="accent1">
-              <a:lumMod val="50000"/>
-            </a:schemeClr>
-          </a:solidFill>
-        </p:spPr>
-        <p:style>
-          <a:lnRef idx="2">
-            <a:schemeClr val="accent1">
-              <a:shade val="50000"/>
-            </a:schemeClr>
-          </a:lnRef>
-          <a:fillRef idx="1">
-            <a:schemeClr val="accent1"/>
-          </a:fillRef>
-          <a:effectRef idx="0">
-            <a:schemeClr val="accent1"/>
-          </a:effectRef>
-          <a:fontRef idx="minor">
-            <a:schemeClr val="lt1"/>
-          </a:fontRef>
-        </p:style>
-        <p:txBody>
-          <a:bodyPr rtlCol="0" anchor="ctr"/>
-          <a:lstStyle/>
-          <a:p>
-            <a:pPr algn="ctr"/>
-            <a:r>
-              <a:rPr lang="en-US" dirty="0" smtClean="0"/>
-              <a:t>Customer</a:t>
-            </a:r>
-            <a:endParaRPr lang="en-US" dirty="0"/>
-          </a:p>
-        </p:txBody>
-      </p:sp>
-      <p:sp>
-        <p:nvSpPr>
-          <p:cNvPr id="18" name="Rectangle 17"/>
-          <p:cNvSpPr/>
-          <p:nvPr/>
-        </p:nvSpPr>
-        <p:spPr>
-          <a:xfrm>
-            <a:off x="4525735" y="4592401"/>
-            <a:ext cx="2743200" cy="1190642"/>
-          </a:xfrm>
-          <a:prstGeom prst="rect">
-            <a:avLst/>
-          </a:prstGeom>
-          <a:solidFill>
-            <a:schemeClr val="accent2"/>
-          </a:solidFill>
-        </p:spPr>
-        <p:style>
-          <a:lnRef idx="2">
-            <a:schemeClr val="accent1">
-              <a:shade val="50000"/>
-            </a:schemeClr>
-          </a:lnRef>
-          <a:fillRef idx="1">
-            <a:schemeClr val="accent1"/>
-          </a:fillRef>
-          <a:effectRef idx="0">
-            <a:schemeClr val="accent1"/>
-          </a:effectRef>
-          <a:fontRef idx="minor">
-            <a:schemeClr val="lt1"/>
-          </a:fontRef>
-        </p:style>
-        <p:txBody>
-          <a:bodyPr rtlCol="0" anchor="ctr"/>
-          <a:lstStyle/>
-          <a:p>
-            <a:pPr marL="171450" indent="-171450">
-              <a:buFont typeface="Arial" panose="020B0604020202020204" pitchFamily="34" charset="0"/>
-              <a:buChar char="•"/>
-            </a:pPr>
-            <a:r>
-              <a:rPr lang="en-US" sz="1400" dirty="0" err="1"/>
-              <a:t>loan_amnt</a:t>
-            </a:r>
-            <a:endParaRPr lang="en-US" sz="1400" dirty="0"/>
-          </a:p>
-          <a:p>
-            <a:pPr marL="171450" indent="-171450">
-              <a:buFont typeface="Arial" panose="020B0604020202020204" pitchFamily="34" charset="0"/>
-              <a:buChar char="•"/>
-            </a:pPr>
-            <a:r>
-              <a:rPr lang="en-US" sz="1400" dirty="0"/>
-              <a:t>installment</a:t>
-            </a:r>
-          </a:p>
-        </p:txBody>
-      </p:sp>
-      <p:sp>
-        <p:nvSpPr>
-          <p:cNvPr id="19" name="Rectangle 18"/>
-          <p:cNvSpPr/>
-          <p:nvPr/>
-        </p:nvSpPr>
-        <p:spPr>
-          <a:xfrm>
-            <a:off x="4525735" y="5811616"/>
-            <a:ext cx="2743200" cy="274320"/>
-          </a:xfrm>
-          <a:prstGeom prst="rect">
-            <a:avLst/>
-          </a:prstGeom>
-          <a:solidFill>
-            <a:schemeClr val="accent2">
-              <a:lumMod val="50000"/>
-            </a:schemeClr>
-          </a:solidFill>
-        </p:spPr>
-        <p:style>
-          <a:lnRef idx="2">
-            <a:schemeClr val="accent1">
-              <a:shade val="50000"/>
-            </a:schemeClr>
-          </a:lnRef>
-          <a:fillRef idx="1">
-            <a:schemeClr val="accent1"/>
-          </a:fillRef>
-          <a:effectRef idx="0">
-            <a:schemeClr val="accent1"/>
-          </a:effectRef>
-          <a:fontRef idx="minor">
-            <a:schemeClr val="lt1"/>
-          </a:fontRef>
-        </p:style>
-        <p:txBody>
-          <a:bodyPr rtlCol="0" anchor="ctr"/>
-          <a:lstStyle/>
-          <a:p>
-            <a:pPr algn="ctr"/>
-            <a:r>
-              <a:rPr lang="en-US" dirty="0" smtClean="0"/>
-              <a:t>Loan </a:t>
-            </a:r>
-            <a:endParaRPr lang="en-US" dirty="0"/>
-          </a:p>
-        </p:txBody>
-      </p:sp>
-      <p:sp>
-        <p:nvSpPr>
-          <p:cNvPr id="20" name="Rectangle 19"/>
-          <p:cNvSpPr/>
-          <p:nvPr/>
-        </p:nvSpPr>
-        <p:spPr>
-          <a:xfrm>
-            <a:off x="7707085" y="4592401"/>
-            <a:ext cx="2743200" cy="1190642"/>
-          </a:xfrm>
-          <a:prstGeom prst="rect">
-            <a:avLst/>
-          </a:prstGeom>
-          <a:solidFill>
-            <a:schemeClr val="accent6"/>
-          </a:solidFill>
-        </p:spPr>
-        <p:style>
-          <a:lnRef idx="2">
-            <a:schemeClr val="accent1">
-              <a:shade val="50000"/>
-            </a:schemeClr>
-          </a:lnRef>
-          <a:fillRef idx="1">
-            <a:schemeClr val="accent1"/>
-          </a:fillRef>
-          <a:effectRef idx="0">
-            <a:schemeClr val="accent1"/>
-          </a:effectRef>
-          <a:fontRef idx="minor">
-            <a:schemeClr val="lt1"/>
-          </a:fontRef>
-        </p:style>
-        <p:txBody>
-          <a:bodyPr rtlCol="0" anchor="ctr"/>
-          <a:lstStyle/>
-          <a:p>
-            <a:pPr marL="171450" indent="-171450">
-              <a:buFont typeface="Arial" panose="020B0604020202020204" pitchFamily="34" charset="0"/>
-              <a:buChar char="•"/>
-            </a:pPr>
-            <a:r>
-              <a:rPr lang="en-US" sz="1400" dirty="0"/>
-              <a:t>Loan amount over annual income</a:t>
-            </a:r>
-          </a:p>
-          <a:p>
-            <a:pPr marL="171450" indent="-171450">
-              <a:buFont typeface="Arial" panose="020B0604020202020204" pitchFamily="34" charset="0"/>
-              <a:buChar char="•"/>
-            </a:pPr>
-            <a:r>
-              <a:rPr lang="en-US" sz="1400" dirty="0"/>
-              <a:t>Surplus amount</a:t>
-            </a:r>
-          </a:p>
-          <a:p>
-            <a:pPr marL="171450" indent="-171450">
-              <a:buFont typeface="Arial" panose="020B0604020202020204" pitchFamily="34" charset="0"/>
-              <a:buChar char="•"/>
-            </a:pPr>
-            <a:r>
-              <a:rPr lang="en-US" sz="1400" dirty="0"/>
-              <a:t>Funded amount over loan amount</a:t>
-            </a:r>
-          </a:p>
-          <a:p>
-            <a:pPr marL="171450" indent="-171450">
-              <a:buFont typeface="Arial" panose="020B0604020202020204" pitchFamily="34" charset="0"/>
-              <a:buChar char="•"/>
-            </a:pPr>
-            <a:r>
-              <a:rPr lang="en-US" sz="1400" dirty="0" err="1"/>
-              <a:t>open_acc</a:t>
-            </a:r>
-            <a:r>
-              <a:rPr lang="en-US" sz="1400" dirty="0"/>
-              <a:t> over </a:t>
-            </a:r>
-            <a:r>
-              <a:rPr lang="en-US" sz="1400" dirty="0" err="1"/>
-              <a:t>total_vamp</a:t>
-            </a:r>
-            <a:endParaRPr lang="en-IN" sz="2000" dirty="0"/>
-          </a:p>
-        </p:txBody>
-      </p:sp>
-      <p:sp>
-        <p:nvSpPr>
-          <p:cNvPr id="21" name="Rectangle 20"/>
-          <p:cNvSpPr/>
-          <p:nvPr/>
-        </p:nvSpPr>
-        <p:spPr>
-          <a:xfrm>
-            <a:off x="7707084" y="5811616"/>
-            <a:ext cx="2743200" cy="274320"/>
-          </a:xfrm>
-          <a:prstGeom prst="rect">
-            <a:avLst/>
-          </a:prstGeom>
-          <a:solidFill>
-            <a:schemeClr val="accent6">
-              <a:lumMod val="50000"/>
-            </a:schemeClr>
-          </a:solidFill>
-          <a:ln>
-            <a:solidFill>
-              <a:schemeClr val="accent6">
-                <a:lumMod val="50000"/>
-              </a:schemeClr>
-            </a:solidFill>
-          </a:ln>
-        </p:spPr>
-        <p:style>
-          <a:lnRef idx="2">
-            <a:schemeClr val="accent1">
-              <a:shade val="50000"/>
-            </a:schemeClr>
-          </a:lnRef>
-          <a:fillRef idx="1">
-            <a:schemeClr val="accent1"/>
-          </a:fillRef>
-          <a:effectRef idx="0">
-            <a:schemeClr val="accent1"/>
-          </a:effectRef>
-          <a:fontRef idx="minor">
-            <a:schemeClr val="lt1"/>
-          </a:fontRef>
-        </p:style>
-        <p:txBody>
-          <a:bodyPr rtlCol="0" anchor="ctr"/>
-          <a:lstStyle/>
-          <a:p>
-            <a:pPr algn="ctr"/>
-            <a:r>
-              <a:rPr lang="en-US" dirty="0" smtClean="0"/>
-              <a:t>Derived</a:t>
-            </a:r>
-            <a:endParaRPr lang="en-US" dirty="0"/>
-          </a:p>
-        </p:txBody>
-      </p:sp>
-      <p:sp>
-        <p:nvSpPr>
-          <p:cNvPr id="22" name="TextBox 21"/>
-          <p:cNvSpPr txBox="1"/>
-          <p:nvPr/>
-        </p:nvSpPr>
-        <p:spPr>
-          <a:xfrm rot="19335274">
-            <a:off x="40241" y="568053"/>
-            <a:ext cx="2608288" cy="369332"/>
-          </a:xfrm>
-          <a:prstGeom prst="rect">
-            <a:avLst/>
-          </a:prstGeom>
-          <a:noFill/>
-        </p:spPr>
-        <p:txBody>
-          <a:bodyPr wrap="square" rtlCol="0">
-            <a:spAutoFit/>
-          </a:bodyPr>
-          <a:lstStyle/>
-          <a:p>
-            <a:r>
-              <a:rPr lang="en-US" dirty="0" smtClean="0">
-                <a:solidFill>
-                  <a:srgbClr val="FF0000"/>
-                </a:solidFill>
-              </a:rPr>
-              <a:t>Ashutosh to update</a:t>
-            </a:r>
-            <a:endParaRPr lang="en-US" dirty="0">
-              <a:solidFill>
-                <a:srgbClr val="FF0000"/>
-              </a:solidFill>
-            </a:endParaRPr>
           </a:p>
         </p:txBody>
       </p:sp>
     </p:spTree>
     <p:extLst>
       <p:ext uri="{BB962C8B-B14F-4D97-AF65-F5344CB8AC3E}">
-        <p14:creationId xmlns:p14="http://schemas.microsoft.com/office/powerpoint/2010/main" val="3517758081"/>
+        <p14:creationId xmlns:p14="http://schemas.microsoft.com/office/powerpoint/2010/main" val="2474277808"/>
       </p:ext>
     </p:extLst>
   </p:cSld>

</xml_diff>